<commit_message>
200321 - mac Stop Signal Problem Fix & 32bits UART Sending, packet communication
</commit_message>
<xml_diff>
--- a/reference/khu_sensor/Packet_Communication.pptx
+++ b/reference/khu_sensor/Packet_Communication.pptx
@@ -7,7 +7,6 @@
   <p:sldIdLst>
     <p:sldId id="256" r:id="rId2"/>
     <p:sldId id="257" r:id="rId3"/>
-    <p:sldId id="258" r:id="rId4"/>
   </p:sldIdLst>
   <p:sldSz cx="9144000" cy="6858000" type="screen4x3"/>
   <p:notesSz cx="6858000" cy="9144000"/>
@@ -245,7 +244,7 @@
           <a:p>
             <a:fld id="{F8D5D2C1-0F38-4F52-9E02-F545D621F86B}" type="datetimeFigureOut">
               <a:rPr lang="ko-KR" altLang="en-US" smtClean="0"/>
-              <a:t>2020. 3. 3.</a:t>
+              <a:t>2020. 3. 21.</a:t>
             </a:fld>
             <a:endParaRPr lang="ko-KR" altLang="en-US"/>
           </a:p>
@@ -415,7 +414,7 @@
           <a:p>
             <a:fld id="{F8D5D2C1-0F38-4F52-9E02-F545D621F86B}" type="datetimeFigureOut">
               <a:rPr lang="ko-KR" altLang="en-US" smtClean="0"/>
-              <a:t>2020. 3. 3.</a:t>
+              <a:t>2020. 3. 21.</a:t>
             </a:fld>
             <a:endParaRPr lang="ko-KR" altLang="en-US"/>
           </a:p>
@@ -595,7 +594,7 @@
           <a:p>
             <a:fld id="{F8D5D2C1-0F38-4F52-9E02-F545D621F86B}" type="datetimeFigureOut">
               <a:rPr lang="ko-KR" altLang="en-US" smtClean="0"/>
-              <a:t>2020. 3. 3.</a:t>
+              <a:t>2020. 3. 21.</a:t>
             </a:fld>
             <a:endParaRPr lang="ko-KR" altLang="en-US"/>
           </a:p>
@@ -765,7 +764,7 @@
           <a:p>
             <a:fld id="{F8D5D2C1-0F38-4F52-9E02-F545D621F86B}" type="datetimeFigureOut">
               <a:rPr lang="ko-KR" altLang="en-US" smtClean="0"/>
-              <a:t>2020. 3. 3.</a:t>
+              <a:t>2020. 3. 21.</a:t>
             </a:fld>
             <a:endParaRPr lang="ko-KR" altLang="en-US"/>
           </a:p>
@@ -1009,7 +1008,7 @@
           <a:p>
             <a:fld id="{F8D5D2C1-0F38-4F52-9E02-F545D621F86B}" type="datetimeFigureOut">
               <a:rPr lang="ko-KR" altLang="en-US" smtClean="0"/>
-              <a:t>2020. 3. 3.</a:t>
+              <a:t>2020. 3. 21.</a:t>
             </a:fld>
             <a:endParaRPr lang="ko-KR" altLang="en-US"/>
           </a:p>
@@ -1241,7 +1240,7 @@
           <a:p>
             <a:fld id="{F8D5D2C1-0F38-4F52-9E02-F545D621F86B}" type="datetimeFigureOut">
               <a:rPr lang="ko-KR" altLang="en-US" smtClean="0"/>
-              <a:t>2020. 3. 3.</a:t>
+              <a:t>2020. 3. 21.</a:t>
             </a:fld>
             <a:endParaRPr lang="ko-KR" altLang="en-US"/>
           </a:p>
@@ -1608,7 +1607,7 @@
           <a:p>
             <a:fld id="{F8D5D2C1-0F38-4F52-9E02-F545D621F86B}" type="datetimeFigureOut">
               <a:rPr lang="ko-KR" altLang="en-US" smtClean="0"/>
-              <a:t>2020. 3. 3.</a:t>
+              <a:t>2020. 3. 21.</a:t>
             </a:fld>
             <a:endParaRPr lang="ko-KR" altLang="en-US"/>
           </a:p>
@@ -1726,7 +1725,7 @@
           <a:p>
             <a:fld id="{F8D5D2C1-0F38-4F52-9E02-F545D621F86B}" type="datetimeFigureOut">
               <a:rPr lang="ko-KR" altLang="en-US" smtClean="0"/>
-              <a:t>2020. 3. 3.</a:t>
+              <a:t>2020. 3. 21.</a:t>
             </a:fld>
             <a:endParaRPr lang="ko-KR" altLang="en-US"/>
           </a:p>
@@ -1821,7 +1820,7 @@
           <a:p>
             <a:fld id="{F8D5D2C1-0F38-4F52-9E02-F545D621F86B}" type="datetimeFigureOut">
               <a:rPr lang="ko-KR" altLang="en-US" smtClean="0"/>
-              <a:t>2020. 3. 3.</a:t>
+              <a:t>2020. 3. 21.</a:t>
             </a:fld>
             <a:endParaRPr lang="ko-KR" altLang="en-US"/>
           </a:p>
@@ -2098,7 +2097,7 @@
           <a:p>
             <a:fld id="{F8D5D2C1-0F38-4F52-9E02-F545D621F86B}" type="datetimeFigureOut">
               <a:rPr lang="ko-KR" altLang="en-US" smtClean="0"/>
-              <a:t>2020. 3. 3.</a:t>
+              <a:t>2020. 3. 21.</a:t>
             </a:fld>
             <a:endParaRPr lang="ko-KR" altLang="en-US"/>
           </a:p>
@@ -2355,7 +2354,7 @@
           <a:p>
             <a:fld id="{F8D5D2C1-0F38-4F52-9E02-F545D621F86B}" type="datetimeFigureOut">
               <a:rPr lang="ko-KR" altLang="en-US" smtClean="0"/>
-              <a:t>2020. 3. 3.</a:t>
+              <a:t>2020. 3. 21.</a:t>
             </a:fld>
             <a:endParaRPr lang="ko-KR" altLang="en-US"/>
           </a:p>
@@ -2568,7 +2567,7 @@
           <a:p>
             <a:fld id="{F8D5D2C1-0F38-4F52-9E02-F545D621F86B}" type="datetimeFigureOut">
               <a:rPr lang="ko-KR" altLang="en-US" smtClean="0"/>
-              <a:t>2020. 3. 3.</a:t>
+              <a:t>2020. 3. 21.</a:t>
             </a:fld>
             <a:endParaRPr lang="ko-KR" altLang="en-US"/>
           </a:p>
@@ -2973,36 +2972,6 @@
           <a:chExt cx="0" cy="0"/>
         </a:xfrm>
       </p:grpSpPr>
-      <p:pic>
-        <p:nvPicPr>
-          <p:cNvPr id="5" name="그림 4">
-            <a:extLst>
-              <a:ext uri="{FF2B5EF4-FFF2-40B4-BE49-F238E27FC236}">
-                <a16:creationId xmlns:a16="http://schemas.microsoft.com/office/drawing/2014/main" id="{DC964865-F2FE-440C-BB25-31C3AC880B3A}"/>
-              </a:ext>
-            </a:extLst>
-          </p:cNvPr>
-          <p:cNvPicPr>
-            <a:picLocks noChangeAspect="1"/>
-          </p:cNvPicPr>
-          <p:nvPr/>
-        </p:nvPicPr>
-        <p:blipFill>
-          <a:blip r:embed="rId2"/>
-          <a:stretch>
-            <a:fillRect/>
-          </a:stretch>
-        </p:blipFill>
-        <p:spPr>
-          <a:xfrm>
-            <a:off x="8112677" y="515408"/>
-            <a:ext cx="1031323" cy="746209"/>
-          </a:xfrm>
-          <a:prstGeom prst="rect">
-            <a:avLst/>
-          </a:prstGeom>
-        </p:spPr>
-      </p:pic>
       <p:cxnSp>
         <p:nvCxnSpPr>
           <p:cNvPr id="7" name="직선 연결선 6">
@@ -3716,48 +3685,6 @@
           </a:fontRef>
         </p:style>
       </p:cxnSp>
-      <p:sp>
-        <p:nvSpPr>
-          <p:cNvPr id="41" name="TextBox 40">
-            <a:extLst>
-              <a:ext uri="{FF2B5EF4-FFF2-40B4-BE49-F238E27FC236}">
-                <a16:creationId xmlns:a16="http://schemas.microsoft.com/office/drawing/2014/main" id="{496D9DC3-2E70-9447-A57B-1C1534F8965B}"/>
-              </a:ext>
-            </a:extLst>
-          </p:cNvPr>
-          <p:cNvSpPr txBox="1"/>
-          <p:nvPr/>
-        </p:nvSpPr>
-        <p:spPr>
-          <a:xfrm>
-            <a:off x="7951587" y="1471473"/>
-            <a:ext cx="1005019" cy="646331"/>
-          </a:xfrm>
-          <a:prstGeom prst="rect">
-            <a:avLst/>
-          </a:prstGeom>
-          <a:noFill/>
-        </p:spPr>
-        <p:txBody>
-          <a:bodyPr wrap="none" rtlCol="0">
-            <a:spAutoFit/>
-          </a:bodyPr>
-          <a:lstStyle/>
-          <a:p>
-            <a:r>
-              <a:rPr lang="en-US" altLang="ko-KR" dirty="0"/>
-              <a:t>MPR Tab</a:t>
-            </a:r>
-          </a:p>
-          <a:p>
-            <a:r>
-              <a:rPr lang="en-US" altLang="ko-KR" dirty="0"/>
-              <a:t>Sync</a:t>
-            </a:r>
-            <a:endParaRPr lang="ko-KR" altLang="en-US" dirty="0"/>
-          </a:p>
-        </p:txBody>
-      </p:sp>
       <p:cxnSp>
         <p:nvCxnSpPr>
           <p:cNvPr id="45" name="직선 연결선 8">
@@ -4327,7 +4254,7 @@
         <p:spPr>
           <a:xfrm>
             <a:off x="4178717" y="4263064"/>
-            <a:ext cx="4761881" cy="369332"/>
+            <a:ext cx="4755341" cy="369332"/>
           </a:xfrm>
           <a:prstGeom prst="rect">
             <a:avLst/>
@@ -4342,7 +4269,7 @@
           <a:p>
             <a:r>
               <a:rPr lang="en-US" altLang="ko-KR" dirty="0"/>
-              <a:t>6. {0x4D, 4’b0, 0x01 Data[3:0], 0x00 Data}(3byte)</a:t>
+              <a:t>6. {0xBB, 4’b0, 0x01 Data[3:0], 0x00 Data}(3byte)</a:t>
             </a:r>
             <a:endParaRPr lang="ko-KR" altLang="en-US" dirty="0"/>
           </a:p>
@@ -4493,83 +4420,6 @@
             <a:r>
               <a:rPr lang="en-US" altLang="ko-KR" dirty="0"/>
               <a:t>Stop</a:t>
-            </a:r>
-            <a:endParaRPr lang="ko-KR" altLang="en-US" dirty="0"/>
-          </a:p>
-        </p:txBody>
-      </p:sp>
-      <p:cxnSp>
-        <p:nvCxnSpPr>
-          <p:cNvPr id="80" name="직선 화살표 연결선 18">
-            <a:extLst>
-              <a:ext uri="{FF2B5EF4-FFF2-40B4-BE49-F238E27FC236}">
-                <a16:creationId xmlns:a16="http://schemas.microsoft.com/office/drawing/2014/main" id="{49BE619B-0FF9-9C47-993D-B3A64DCA45BB}"/>
-              </a:ext>
-            </a:extLst>
-          </p:cNvPr>
-          <p:cNvCxnSpPr>
-            <a:cxnSpLocks/>
-          </p:cNvCxnSpPr>
-          <p:nvPr/>
-        </p:nvCxnSpPr>
-        <p:spPr>
-          <a:xfrm flipH="1">
-            <a:off x="4256262" y="5025597"/>
-            <a:ext cx="3639551" cy="1232"/>
-          </a:xfrm>
-          <a:prstGeom prst="straightConnector1">
-            <a:avLst/>
-          </a:prstGeom>
-          <a:ln>
-            <a:tailEnd type="triangle"/>
-          </a:ln>
-        </p:spPr>
-        <p:style>
-          <a:lnRef idx="1">
-            <a:schemeClr val="accent1"/>
-          </a:lnRef>
-          <a:fillRef idx="0">
-            <a:schemeClr val="accent1"/>
-          </a:fillRef>
-          <a:effectRef idx="0">
-            <a:schemeClr val="accent1"/>
-          </a:effectRef>
-          <a:fontRef idx="minor">
-            <a:schemeClr val="tx1"/>
-          </a:fontRef>
-        </p:style>
-      </p:cxnSp>
-      <p:sp>
-        <p:nvSpPr>
-          <p:cNvPr id="81" name="TextBox 80">
-            <a:extLst>
-              <a:ext uri="{FF2B5EF4-FFF2-40B4-BE49-F238E27FC236}">
-                <a16:creationId xmlns:a16="http://schemas.microsoft.com/office/drawing/2014/main" id="{8BFD1870-986F-3F45-8AA6-0904F612FC62}"/>
-              </a:ext>
-            </a:extLst>
-          </p:cNvPr>
-          <p:cNvSpPr txBox="1"/>
-          <p:nvPr/>
-        </p:nvSpPr>
-        <p:spPr>
-          <a:xfrm>
-            <a:off x="5629124" y="4687855"/>
-            <a:ext cx="862737" cy="369332"/>
-          </a:xfrm>
-          <a:prstGeom prst="rect">
-            <a:avLst/>
-          </a:prstGeom>
-          <a:noFill/>
-        </p:spPr>
-        <p:txBody>
-          <a:bodyPr wrap="none" rtlCol="0">
-            <a:spAutoFit/>
-          </a:bodyPr>
-          <a:lstStyle/>
-          <a:p>
-            <a:r>
-              <a:rPr lang="en-US" altLang="ko-KR" dirty="0"/>
-              <a:t>7. 0x66</a:t>
             </a:r>
             <a:endParaRPr lang="ko-KR" altLang="en-US" dirty="0"/>
           </a:p>
@@ -5810,10 +5660,10 @@
       </p:sp>
       <p:cxnSp>
         <p:nvCxnSpPr>
-          <p:cNvPr id="112" name="직선 화살표 연결선 18">
-            <a:extLst>
-              <a:ext uri="{FF2B5EF4-FFF2-40B4-BE49-F238E27FC236}">
-                <a16:creationId xmlns:a16="http://schemas.microsoft.com/office/drawing/2014/main" id="{A60EF45E-9102-AE44-94C7-F1A9531A8E27}"/>
+          <p:cNvPr id="114" name="직선 화살표 연결선 18">
+            <a:extLst>
+              <a:ext uri="{FF2B5EF4-FFF2-40B4-BE49-F238E27FC236}">
+                <a16:creationId xmlns:a16="http://schemas.microsoft.com/office/drawing/2014/main" id="{8910CA33-5570-B64D-8761-49A2042DCCF1}"/>
               </a:ext>
             </a:extLst>
           </p:cNvPr>
@@ -5823,9 +5673,9 @@
           <p:nvPr/>
         </p:nvCxnSpPr>
         <p:spPr>
-          <a:xfrm flipH="1">
-            <a:off x="4586101" y="3402747"/>
-            <a:ext cx="3336413" cy="0"/>
+          <a:xfrm flipH="1" flipV="1">
+            <a:off x="4224024" y="5164362"/>
+            <a:ext cx="3727563" cy="40019"/>
           </a:xfrm>
           <a:prstGeom prst="straightConnector1">
             <a:avLst/>
@@ -5851,10 +5701,10 @@
       </p:cxnSp>
       <p:sp>
         <p:nvSpPr>
-          <p:cNvPr id="113" name="TextBox 112">
-            <a:extLst>
-              <a:ext uri="{FF2B5EF4-FFF2-40B4-BE49-F238E27FC236}">
-                <a16:creationId xmlns:a16="http://schemas.microsoft.com/office/drawing/2014/main" id="{271F3DA0-6850-6444-BBF0-4DC06AB4D1BE}"/>
+          <p:cNvPr id="115" name="TextBox 114">
+            <a:extLst>
+              <a:ext uri="{FF2B5EF4-FFF2-40B4-BE49-F238E27FC236}">
+                <a16:creationId xmlns:a16="http://schemas.microsoft.com/office/drawing/2014/main" id="{4144873E-232C-554C-9FB8-D4A3F26C2E7A}"/>
               </a:ext>
             </a:extLst>
           </p:cNvPr>
@@ -5863,8 +5713,8 @@
         </p:nvSpPr>
         <p:spPr>
           <a:xfrm>
-            <a:off x="5655824" y="3065005"/>
-            <a:ext cx="862737" cy="369332"/>
+            <a:off x="5684897" y="4866639"/>
+            <a:ext cx="635110" cy="369332"/>
           </a:xfrm>
           <a:prstGeom prst="rect">
             <a:avLst/>
@@ -5879,7 +5729,43 @@
           <a:p>
             <a:r>
               <a:rPr lang="en-US" altLang="ko-KR" dirty="0"/>
-              <a:t>4. 0x46</a:t>
+              <a:t>0x53</a:t>
+            </a:r>
+            <a:endParaRPr lang="ko-KR" altLang="en-US" dirty="0"/>
+          </a:p>
+        </p:txBody>
+      </p:sp>
+      <p:sp>
+        <p:nvSpPr>
+          <p:cNvPr id="116" name="TextBox 115">
+            <a:extLst>
+              <a:ext uri="{FF2B5EF4-FFF2-40B4-BE49-F238E27FC236}">
+                <a16:creationId xmlns:a16="http://schemas.microsoft.com/office/drawing/2014/main" id="{E411D8E6-B3F7-9B48-8B7E-7B1AEC183FCF}"/>
+              </a:ext>
+            </a:extLst>
+          </p:cNvPr>
+          <p:cNvSpPr txBox="1"/>
+          <p:nvPr/>
+        </p:nvSpPr>
+        <p:spPr>
+          <a:xfrm>
+            <a:off x="1463184" y="4805577"/>
+            <a:ext cx="2167260" cy="369332"/>
+          </a:xfrm>
+          <a:prstGeom prst="rect">
+            <a:avLst/>
+          </a:prstGeom>
+          <a:noFill/>
+        </p:spPr>
+        <p:txBody>
+          <a:bodyPr wrap="none" rtlCol="0">
+            <a:spAutoFit/>
+          </a:bodyPr>
+          <a:lstStyle/>
+          <a:p>
+            <a:r>
+              <a:rPr lang="en-US" altLang="ko-KR" dirty="0"/>
+              <a:t>0x11(write)(SDATAC) </a:t>
             </a:r>
             <a:endParaRPr lang="ko-KR" altLang="en-US" dirty="0"/>
           </a:p>
@@ -5887,10 +5773,10 @@
       </p:sp>
       <p:cxnSp>
         <p:nvCxnSpPr>
-          <p:cNvPr id="114" name="직선 화살표 연결선 18">
-            <a:extLst>
-              <a:ext uri="{FF2B5EF4-FFF2-40B4-BE49-F238E27FC236}">
-                <a16:creationId xmlns:a16="http://schemas.microsoft.com/office/drawing/2014/main" id="{8910CA33-5570-B64D-8761-49A2042DCCF1}"/>
+          <p:cNvPr id="117" name="직선 화살표 연결선 18">
+            <a:extLst>
+              <a:ext uri="{FF2B5EF4-FFF2-40B4-BE49-F238E27FC236}">
+                <a16:creationId xmlns:a16="http://schemas.microsoft.com/office/drawing/2014/main" id="{0612A8CD-CB58-D245-AA7D-E17E91247D54}"/>
               </a:ext>
             </a:extLst>
           </p:cNvPr>
@@ -5901,8 +5787,8 @@
         </p:nvCxnSpPr>
         <p:spPr>
           <a:xfrm flipH="1" flipV="1">
-            <a:off x="4224024" y="5164362"/>
-            <a:ext cx="3727563" cy="40019"/>
+            <a:off x="416025" y="5122991"/>
+            <a:ext cx="3796755" cy="4995"/>
           </a:xfrm>
           <a:prstGeom prst="straightConnector1">
             <a:avLst/>
@@ -5928,82 +5814,151 @@
       </p:cxnSp>
       <p:sp>
         <p:nvSpPr>
-          <p:cNvPr id="115" name="TextBox 114">
-            <a:extLst>
-              <a:ext uri="{FF2B5EF4-FFF2-40B4-BE49-F238E27FC236}">
-                <a16:creationId xmlns:a16="http://schemas.microsoft.com/office/drawing/2014/main" id="{4144873E-232C-554C-9FB8-D4A3F26C2E7A}"/>
-              </a:ext>
-            </a:extLst>
-          </p:cNvPr>
-          <p:cNvSpPr txBox="1"/>
-          <p:nvPr/>
-        </p:nvSpPr>
-        <p:spPr>
-          <a:xfrm>
-            <a:off x="5684897" y="4866639"/>
-            <a:ext cx="635110" cy="369332"/>
+          <p:cNvPr id="4" name="Rectangle 3">
+            <a:extLst>
+              <a:ext uri="{FF2B5EF4-FFF2-40B4-BE49-F238E27FC236}">
+                <a16:creationId xmlns:a16="http://schemas.microsoft.com/office/drawing/2014/main" id="{E6E0AA2A-0FBB-D542-9EB2-63E44F65ECA9}"/>
+              </a:ext>
+            </a:extLst>
+          </p:cNvPr>
+          <p:cNvSpPr/>
+          <p:nvPr/>
+        </p:nvSpPr>
+        <p:spPr>
+          <a:xfrm>
+            <a:off x="7895813" y="2422886"/>
+            <a:ext cx="1153008" cy="1661993"/>
           </a:xfrm>
           <a:prstGeom prst="rect">
             <a:avLst/>
           </a:prstGeom>
-          <a:noFill/>
-        </p:spPr>
-        <p:txBody>
-          <a:bodyPr wrap="none" rtlCol="0">
+        </p:spPr>
+        <p:txBody>
+          <a:bodyPr wrap="none">
             <a:spAutoFit/>
           </a:bodyPr>
           <a:lstStyle/>
           <a:p>
             <a:r>
               <a:rPr lang="en-US" altLang="ko-KR" dirty="0"/>
-              <a:t>0x53</a:t>
-            </a:r>
-            <a:endParaRPr lang="ko-KR" altLang="en-US" dirty="0"/>
-          </a:p>
-        </p:txBody>
-      </p:sp>
-      <p:sp>
-        <p:nvSpPr>
-          <p:cNvPr id="116" name="TextBox 115">
-            <a:extLst>
-              <a:ext uri="{FF2B5EF4-FFF2-40B4-BE49-F238E27FC236}">
-                <a16:creationId xmlns:a16="http://schemas.microsoft.com/office/drawing/2014/main" id="{E411D8E6-B3F7-9B48-8B7E-7B1AEC183FCF}"/>
-              </a:ext>
-            </a:extLst>
-          </p:cNvPr>
-          <p:cNvSpPr txBox="1"/>
-          <p:nvPr/>
-        </p:nvSpPr>
-        <p:spPr>
-          <a:xfrm>
-            <a:off x="1463184" y="4805577"/>
-            <a:ext cx="2167260" cy="369332"/>
+              <a:t>Run </a:t>
+            </a:r>
+          </a:p>
+          <a:p>
+            <a:endParaRPr lang="en-US" altLang="ko-KR" dirty="0"/>
+          </a:p>
+          <a:p>
+            <a:r>
+              <a:rPr lang="ko-KR" altLang="en-US" sz="1200" dirty="0"/>
+              <a:t>버튼 클릭 후</a:t>
+            </a:r>
+            <a:endParaRPr lang="en-US" altLang="ko-KR" sz="1200" dirty="0"/>
+          </a:p>
+          <a:p>
+            <a:r>
+              <a:rPr lang="en-US" altLang="ko-KR" sz="1200" dirty="0"/>
+              <a:t>Stop </a:t>
+            </a:r>
+            <a:r>
+              <a:rPr lang="ko-KR" altLang="en-US" sz="1200" dirty="0"/>
+              <a:t>누르기 전</a:t>
+            </a:r>
+            <a:endParaRPr lang="en-US" altLang="ko-KR" sz="1200" dirty="0"/>
+          </a:p>
+          <a:p>
+            <a:r>
+              <a:rPr lang="ko-KR" altLang="en-US" sz="1200" dirty="0"/>
+              <a:t>까지 </a:t>
+            </a:r>
+            <a:endParaRPr lang="en-US" altLang="ko-KR" sz="1200" dirty="0"/>
+          </a:p>
+          <a:p>
+            <a:r>
+              <a:rPr lang="en-US" altLang="ko-KR" sz="1200" dirty="0"/>
+              <a:t>2</a:t>
+            </a:r>
+            <a:r>
+              <a:rPr lang="ko-KR" altLang="en-US" sz="1200" dirty="0"/>
+              <a:t> </a:t>
+            </a:r>
+            <a:r>
+              <a:rPr lang="en-US" altLang="ko-KR" sz="1200" dirty="0"/>
+              <a:t>~</a:t>
+            </a:r>
+            <a:r>
+              <a:rPr lang="ko-KR" altLang="en-US" sz="1200" dirty="0"/>
+              <a:t> </a:t>
+            </a:r>
+            <a:r>
+              <a:rPr lang="en-US" altLang="ko-KR" sz="1200" dirty="0"/>
+              <a:t>4</a:t>
+            </a:r>
+            <a:r>
+              <a:rPr lang="ko-KR" altLang="en-US" sz="1200" dirty="0"/>
+              <a:t> 번 </a:t>
+            </a:r>
+            <a:r>
+              <a:rPr lang="en-US" altLang="ko-KR" sz="1200" dirty="0"/>
+              <a:t>Loop</a:t>
+            </a:r>
+          </a:p>
+          <a:p>
+            <a:endParaRPr lang="en-US" altLang="ko-KR" dirty="0"/>
+          </a:p>
+        </p:txBody>
+      </p:sp>
+      <p:sp>
+        <p:nvSpPr>
+          <p:cNvPr id="119" name="Rectangle 118">
+            <a:extLst>
+              <a:ext uri="{FF2B5EF4-FFF2-40B4-BE49-F238E27FC236}">
+                <a16:creationId xmlns:a16="http://schemas.microsoft.com/office/drawing/2014/main" id="{0A98AC54-B0C1-664C-A6F7-13B8D3F6B1B6}"/>
+              </a:ext>
+            </a:extLst>
+          </p:cNvPr>
+          <p:cNvSpPr/>
+          <p:nvPr/>
+        </p:nvSpPr>
+        <p:spPr>
+          <a:xfrm>
+            <a:off x="-14513" y="2599502"/>
+            <a:ext cx="912429" cy="923330"/>
           </a:xfrm>
           <a:prstGeom prst="rect">
             <a:avLst/>
           </a:prstGeom>
-          <a:noFill/>
-        </p:spPr>
-        <p:txBody>
-          <a:bodyPr wrap="none" rtlCol="0">
+        </p:spPr>
+        <p:txBody>
+          <a:bodyPr wrap="none">
             <a:spAutoFit/>
           </a:bodyPr>
           <a:lstStyle/>
           <a:p>
             <a:r>
               <a:rPr lang="en-US" altLang="ko-KR" dirty="0"/>
-              <a:t>0x11(write)(SDATAC) </a:t>
-            </a:r>
-            <a:endParaRPr lang="ko-KR" altLang="en-US" dirty="0"/>
+              <a:t>DRDY</a:t>
+            </a:r>
+          </a:p>
+          <a:p>
+            <a:r>
+              <a:rPr lang="en-US" altLang="ko-KR" dirty="0"/>
+              <a:t>Pulse</a:t>
+            </a:r>
+          </a:p>
+          <a:p>
+            <a:r>
+              <a:rPr lang="en-US" altLang="ko-KR" dirty="0"/>
+              <a:t>(250Hz)</a:t>
+            </a:r>
           </a:p>
         </p:txBody>
       </p:sp>
       <p:cxnSp>
         <p:nvCxnSpPr>
-          <p:cNvPr id="117" name="직선 화살표 연결선 18">
-            <a:extLst>
-              <a:ext uri="{FF2B5EF4-FFF2-40B4-BE49-F238E27FC236}">
-                <a16:creationId xmlns:a16="http://schemas.microsoft.com/office/drawing/2014/main" id="{0612A8CD-CB58-D245-AA7D-E17E91247D54}"/>
+          <p:cNvPr id="121" name="직선 화살표 연결선 35">
+            <a:extLst>
+              <a:ext uri="{FF2B5EF4-FFF2-40B4-BE49-F238E27FC236}">
+                <a16:creationId xmlns:a16="http://schemas.microsoft.com/office/drawing/2014/main" id="{8871E4C8-05D6-5643-BB26-094592EA54DB}"/>
               </a:ext>
             </a:extLst>
           </p:cNvPr>
@@ -6013,9 +5968,9 @@
           <p:nvPr/>
         </p:nvCxnSpPr>
         <p:spPr>
-          <a:xfrm flipH="1" flipV="1">
-            <a:off x="416025" y="5122991"/>
-            <a:ext cx="3796755" cy="4995"/>
+          <a:xfrm flipV="1">
+            <a:off x="4602128" y="3094511"/>
+            <a:ext cx="3308268" cy="5246"/>
           </a:xfrm>
           <a:prstGeom prst="straightConnector1">
             <a:avLst/>
@@ -6041,52 +5996,10 @@
       </p:cxnSp>
       <p:sp>
         <p:nvSpPr>
-          <p:cNvPr id="118" name="TextBox 117">
-            <a:extLst>
-              <a:ext uri="{FF2B5EF4-FFF2-40B4-BE49-F238E27FC236}">
-                <a16:creationId xmlns:a16="http://schemas.microsoft.com/office/drawing/2014/main" id="{F41F06EF-4751-334E-82B0-3A34255CD302}"/>
-              </a:ext>
-            </a:extLst>
-          </p:cNvPr>
-          <p:cNvSpPr txBox="1"/>
-          <p:nvPr/>
-        </p:nvSpPr>
-        <p:spPr>
-          <a:xfrm>
-            <a:off x="7941007" y="738721"/>
-            <a:ext cx="945708" cy="646331"/>
-          </a:xfrm>
-          <a:prstGeom prst="rect">
-            <a:avLst/>
-          </a:prstGeom>
-          <a:noFill/>
-        </p:spPr>
-        <p:txBody>
-          <a:bodyPr wrap="none" rtlCol="0">
-            <a:spAutoFit/>
-          </a:bodyPr>
-          <a:lstStyle/>
-          <a:p>
-            <a:r>
-              <a:rPr lang="en-US" altLang="ko-KR" dirty="0"/>
-              <a:t>ADS Tab</a:t>
-            </a:r>
-          </a:p>
-          <a:p>
-            <a:r>
-              <a:rPr lang="en-US" altLang="ko-KR" dirty="0"/>
-              <a:t>Sync</a:t>
-            </a:r>
-            <a:endParaRPr lang="ko-KR" altLang="en-US" dirty="0"/>
-          </a:p>
-        </p:txBody>
-      </p:sp>
-      <p:sp>
-        <p:nvSpPr>
-          <p:cNvPr id="4" name="Rectangle 3">
-            <a:extLst>
-              <a:ext uri="{FF2B5EF4-FFF2-40B4-BE49-F238E27FC236}">
-                <a16:creationId xmlns:a16="http://schemas.microsoft.com/office/drawing/2014/main" id="{E6E0AA2A-0FBB-D542-9EB2-63E44F65ECA9}"/>
+          <p:cNvPr id="128" name="Rectangle 127">
+            <a:extLst>
+              <a:ext uri="{FF2B5EF4-FFF2-40B4-BE49-F238E27FC236}">
+                <a16:creationId xmlns:a16="http://schemas.microsoft.com/office/drawing/2014/main" id="{0562EA6A-6733-924D-BD6D-BD6EBD2C6355}"/>
               </a:ext>
             </a:extLst>
           </p:cNvPr>
@@ -6095,8 +6008,8 @@
         </p:nvSpPr>
         <p:spPr>
           <a:xfrm>
-            <a:off x="7895813" y="2422886"/>
-            <a:ext cx="1153008" cy="1661993"/>
+            <a:off x="4572000" y="2702971"/>
+            <a:ext cx="2883995" cy="369332"/>
           </a:xfrm>
           <a:prstGeom prst="rect">
             <a:avLst/>
@@ -6110,188 +6023,7 @@
           <a:p>
             <a:r>
               <a:rPr lang="en-US" altLang="ko-KR" dirty="0"/>
-              <a:t>Run </a:t>
-            </a:r>
-          </a:p>
-          <a:p>
-            <a:endParaRPr lang="en-US" altLang="ko-KR" dirty="0"/>
-          </a:p>
-          <a:p>
-            <a:r>
-              <a:rPr lang="ko-KR" altLang="en-US" sz="1200" dirty="0"/>
-              <a:t>버튼 클릭 후</a:t>
-            </a:r>
-            <a:endParaRPr lang="en-US" altLang="ko-KR" sz="1200" dirty="0"/>
-          </a:p>
-          <a:p>
-            <a:r>
-              <a:rPr lang="en-US" altLang="ko-KR" sz="1200" dirty="0"/>
-              <a:t>Stop </a:t>
-            </a:r>
-            <a:r>
-              <a:rPr lang="ko-KR" altLang="en-US" sz="1200" dirty="0"/>
-              <a:t>누르기 전</a:t>
-            </a:r>
-            <a:endParaRPr lang="en-US" altLang="ko-KR" sz="1200" dirty="0"/>
-          </a:p>
-          <a:p>
-            <a:r>
-              <a:rPr lang="ko-KR" altLang="en-US" sz="1200" dirty="0"/>
-              <a:t>까지 </a:t>
-            </a:r>
-            <a:endParaRPr lang="en-US" altLang="ko-KR" sz="1200" dirty="0"/>
-          </a:p>
-          <a:p>
-            <a:r>
-              <a:rPr lang="en-US" altLang="ko-KR" sz="1200" dirty="0"/>
-              <a:t>2</a:t>
-            </a:r>
-            <a:r>
-              <a:rPr lang="ko-KR" altLang="en-US" sz="1200" dirty="0"/>
-              <a:t> </a:t>
-            </a:r>
-            <a:r>
-              <a:rPr lang="en-US" altLang="ko-KR" sz="1200" dirty="0"/>
-              <a:t>~</a:t>
-            </a:r>
-            <a:r>
-              <a:rPr lang="ko-KR" altLang="en-US" sz="1200" dirty="0"/>
-              <a:t> </a:t>
-            </a:r>
-            <a:r>
-              <a:rPr lang="en-US" altLang="ko-KR" sz="1200" dirty="0"/>
-              <a:t>4</a:t>
-            </a:r>
-            <a:r>
-              <a:rPr lang="ko-KR" altLang="en-US" sz="1200" dirty="0"/>
-              <a:t> 번 </a:t>
-            </a:r>
-            <a:r>
-              <a:rPr lang="en-US" altLang="ko-KR" sz="1200" dirty="0"/>
-              <a:t>Loop</a:t>
-            </a:r>
-          </a:p>
-          <a:p>
-            <a:endParaRPr lang="en-US" altLang="ko-KR" dirty="0"/>
-          </a:p>
-        </p:txBody>
-      </p:sp>
-      <p:sp>
-        <p:nvSpPr>
-          <p:cNvPr id="119" name="Rectangle 118">
-            <a:extLst>
-              <a:ext uri="{FF2B5EF4-FFF2-40B4-BE49-F238E27FC236}">
-                <a16:creationId xmlns:a16="http://schemas.microsoft.com/office/drawing/2014/main" id="{0A98AC54-B0C1-664C-A6F7-13B8D3F6B1B6}"/>
-              </a:ext>
-            </a:extLst>
-          </p:cNvPr>
-          <p:cNvSpPr/>
-          <p:nvPr/>
-        </p:nvSpPr>
-        <p:spPr>
-          <a:xfrm>
-            <a:off x="-2415" y="2796074"/>
-            <a:ext cx="545342" cy="553998"/>
-          </a:xfrm>
-          <a:prstGeom prst="rect">
-            <a:avLst/>
-          </a:prstGeom>
-        </p:spPr>
-        <p:txBody>
-          <a:bodyPr wrap="none">
-            <a:spAutoFit/>
-          </a:bodyPr>
-          <a:lstStyle/>
-          <a:p>
-            <a:r>
-              <a:rPr lang="ko-KR" altLang="en-US" sz="1200" dirty="0"/>
-              <a:t>조건 </a:t>
-            </a:r>
-            <a:endParaRPr lang="en-US" altLang="ko-KR" sz="1200" dirty="0"/>
-          </a:p>
-          <a:p>
-            <a:r>
-              <a:rPr lang="ko-KR" altLang="en-US" sz="1200" dirty="0"/>
-              <a:t>완료</a:t>
-            </a:r>
-            <a:r>
-              <a:rPr lang="en-US" altLang="ko-KR" dirty="0"/>
-              <a:t> </a:t>
-            </a:r>
-          </a:p>
-        </p:txBody>
-      </p:sp>
-      <p:cxnSp>
-        <p:nvCxnSpPr>
-          <p:cNvPr id="121" name="직선 화살표 연결선 35">
-            <a:extLst>
-              <a:ext uri="{FF2B5EF4-FFF2-40B4-BE49-F238E27FC236}">
-                <a16:creationId xmlns:a16="http://schemas.microsoft.com/office/drawing/2014/main" id="{8871E4C8-05D6-5643-BB26-094592EA54DB}"/>
-              </a:ext>
-            </a:extLst>
-          </p:cNvPr>
-          <p:cNvCxnSpPr>
-            <a:cxnSpLocks/>
-          </p:cNvCxnSpPr>
-          <p:nvPr/>
-        </p:nvCxnSpPr>
-        <p:spPr>
-          <a:xfrm flipV="1">
-            <a:off x="4602128" y="3094511"/>
-            <a:ext cx="3308268" cy="5246"/>
-          </a:xfrm>
-          <a:prstGeom prst="straightConnector1">
-            <a:avLst/>
-          </a:prstGeom>
-          <a:ln>
-            <a:tailEnd type="triangle"/>
-          </a:ln>
-        </p:spPr>
-        <p:style>
-          <a:lnRef idx="1">
-            <a:schemeClr val="accent1"/>
-          </a:lnRef>
-          <a:fillRef idx="0">
-            <a:schemeClr val="accent1"/>
-          </a:fillRef>
-          <a:effectRef idx="0">
-            <a:schemeClr val="accent1"/>
-          </a:effectRef>
-          <a:fontRef idx="minor">
-            <a:schemeClr val="tx1"/>
-          </a:fontRef>
-        </p:style>
-      </p:cxnSp>
-      <p:sp>
-        <p:nvSpPr>
-          <p:cNvPr id="128" name="Rectangle 127">
-            <a:extLst>
-              <a:ext uri="{FF2B5EF4-FFF2-40B4-BE49-F238E27FC236}">
-                <a16:creationId xmlns:a16="http://schemas.microsoft.com/office/drawing/2014/main" id="{0562EA6A-6733-924D-BD6D-BD6EBD2C6355}"/>
-              </a:ext>
-            </a:extLst>
-          </p:cNvPr>
-          <p:cNvSpPr/>
-          <p:nvPr/>
-        </p:nvSpPr>
-        <p:spPr>
-          <a:xfrm>
-            <a:off x="4572000" y="2702971"/>
-            <a:ext cx="3411318" cy="369332"/>
-          </a:xfrm>
-          <a:prstGeom prst="rect">
-            <a:avLst/>
-          </a:prstGeom>
-        </p:spPr>
-        <p:txBody>
-          <a:bodyPr wrap="none">
-            <a:spAutoFit/>
-          </a:bodyPr>
-          <a:lstStyle/>
-          <a:p>
-            <a:r>
-              <a:rPr lang="en-US" altLang="ko-KR" dirty="0"/>
-              <a:t>3. {0x41, 0x00, CH2(3byte)}(5byte)</a:t>
+              <a:t>3. {0xAA, CH2(3byte)}(4byte)</a:t>
             </a:r>
             <a:endParaRPr lang="ko-KR" altLang="en-US" dirty="0"/>
           </a:p>
@@ -6301,635 +6033,6 @@
     <p:extLst>
       <p:ext uri="{BB962C8B-B14F-4D97-AF65-F5344CB8AC3E}">
         <p14:creationId xmlns:p14="http://schemas.microsoft.com/office/powerpoint/2010/main" val="3340799806"/>
-      </p:ext>
-    </p:extLst>
-  </p:cSld>
-  <p:clrMapOvr>
-    <a:masterClrMapping/>
-  </p:clrMapOvr>
-</p:sld>
-</file>
-
-<file path=ppt/slides/slide3.xml><?xml version="1.0" encoding="utf-8"?>
-<p:sld xmlns:a="http://schemas.openxmlformats.org/drawingml/2006/main" xmlns:r="http://schemas.openxmlformats.org/officeDocument/2006/relationships" xmlns:p="http://schemas.openxmlformats.org/presentationml/2006/main">
-  <p:cSld>
-    <p:spTree>
-      <p:nvGrpSpPr>
-        <p:cNvPr id="1" name=""/>
-        <p:cNvGrpSpPr/>
-        <p:nvPr/>
-      </p:nvGrpSpPr>
-      <p:grpSpPr>
-        <a:xfrm>
-          <a:off x="0" y="0"/>
-          <a:ext cx="0" cy="0"/>
-          <a:chOff x="0" y="0"/>
-          <a:chExt cx="0" cy="0"/>
-        </a:xfrm>
-      </p:grpSpPr>
-      <p:sp>
-        <p:nvSpPr>
-          <p:cNvPr id="3" name="Content Placeholder 2">
-            <a:extLst>
-              <a:ext uri="{FF2B5EF4-FFF2-40B4-BE49-F238E27FC236}">
-                <a16:creationId xmlns:a16="http://schemas.microsoft.com/office/drawing/2014/main" id="{B2FE8AF0-3775-7242-85C8-C2BCE6B7BDBE}"/>
-              </a:ext>
-            </a:extLst>
-          </p:cNvPr>
-          <p:cNvSpPr>
-            <a:spLocks noGrp="1"/>
-          </p:cNvSpPr>
-          <p:nvPr>
-            <p:ph idx="1"/>
-          </p:nvPr>
-        </p:nvSpPr>
-        <p:spPr>
-          <a:xfrm>
-            <a:off x="628650" y="115910"/>
-            <a:ext cx="7886700" cy="6619741"/>
-          </a:xfrm>
-        </p:spPr>
-        <p:txBody>
-          <a:bodyPr>
-            <a:normAutofit/>
-          </a:bodyPr>
-          <a:lstStyle/>
-          <a:p>
-            <a:pPr marL="0" indent="0">
-              <a:buNone/>
-            </a:pPr>
-            <a:r>
-              <a:rPr lang="en-KR" sz="1600" dirty="0"/>
-              <a:t>1.  </a:t>
-            </a:r>
-            <a:r>
-              <a:rPr lang="ko-KR" altLang="en-US" sz="1600" dirty="0"/>
-              <a:t>현재 </a:t>
-            </a:r>
-            <a:r>
-              <a:rPr lang="en-US" sz="1600" dirty="0"/>
-              <a:t>header</a:t>
-            </a:r>
-            <a:r>
-              <a:rPr lang="ko-KR" altLang="en-US" sz="1600" dirty="0"/>
-              <a:t>나 </a:t>
-            </a:r>
-            <a:r>
-              <a:rPr lang="en-US" sz="1600" dirty="0"/>
-              <a:t>tail, CRC </a:t>
-            </a:r>
-            <a:r>
-              <a:rPr lang="ko-KR" altLang="en-US" sz="1600" dirty="0"/>
-              <a:t>없습니다</a:t>
-            </a:r>
-            <a:r>
-              <a:rPr lang="en-US" altLang="ko-KR" sz="1600" dirty="0"/>
-              <a:t>.</a:t>
-            </a:r>
-            <a:r>
-              <a:rPr lang="ko-KR" altLang="en-US" sz="1600" dirty="0"/>
-              <a:t> 단지 </a:t>
-            </a:r>
-            <a:r>
-              <a:rPr lang="en-US" altLang="ko-KR" sz="1600" dirty="0"/>
-              <a:t>ADS</a:t>
-            </a:r>
-            <a:r>
-              <a:rPr lang="ko-KR" altLang="en-US" sz="1600" dirty="0"/>
-              <a:t>와 </a:t>
-            </a:r>
-            <a:r>
-              <a:rPr lang="en-US" altLang="ko-KR" sz="1600" dirty="0"/>
-              <a:t>MPR</a:t>
-            </a:r>
-            <a:r>
-              <a:rPr lang="ko-KR" altLang="en-US" sz="1600" dirty="0"/>
-              <a:t>의 데이터를 구분하는 </a:t>
-            </a:r>
-            <a:endParaRPr lang="en-US" altLang="ko-KR" sz="1600" dirty="0"/>
-          </a:p>
-          <a:p>
-            <a:pPr marL="0" indent="0">
-              <a:buNone/>
-            </a:pPr>
-            <a:r>
-              <a:rPr lang="en-US" altLang="ko-KR" sz="1600" dirty="0"/>
-              <a:t>0x4D(MPR121), 0x41(ADS1292)</a:t>
-            </a:r>
-            <a:r>
-              <a:rPr lang="ko-KR" altLang="en-US" sz="1600" dirty="0"/>
-              <a:t>만 첫 바이트에 붙여 데이터 처리를 진행하였습니다</a:t>
-            </a:r>
-            <a:r>
-              <a:rPr lang="en-US" altLang="ko-KR" sz="1600" dirty="0"/>
-              <a:t>.</a:t>
-            </a:r>
-          </a:p>
-          <a:p>
-            <a:pPr marL="0" indent="0">
-              <a:buNone/>
-            </a:pPr>
-            <a:endParaRPr lang="en-US" sz="1600" dirty="0"/>
-          </a:p>
-          <a:p>
-            <a:pPr marL="342900" indent="-342900">
-              <a:buAutoNum type="arabicPeriod" startAt="2"/>
-            </a:pPr>
-            <a:r>
-              <a:rPr lang="en-US" altLang="ko-KR" sz="1600" dirty="0"/>
-              <a:t>ADS </a:t>
-            </a:r>
-            <a:r>
-              <a:rPr lang="ko-KR" altLang="en-US" sz="1600" dirty="0"/>
-              <a:t>의 데이터는 </a:t>
-            </a:r>
-            <a:r>
-              <a:rPr lang="en-US" altLang="ko-KR" sz="1600" dirty="0"/>
-              <a:t>72bits</a:t>
-            </a:r>
-            <a:r>
-              <a:rPr lang="ko-KR" altLang="en-US" sz="1600" dirty="0"/>
-              <a:t>로 구성되어있으며 정확히 풀어서 작성해보면 </a:t>
-            </a:r>
-            <a:endParaRPr lang="en-US" altLang="ko-KR" sz="1600" dirty="0"/>
-          </a:p>
-          <a:p>
-            <a:pPr marL="0" indent="0">
-              <a:buNone/>
-            </a:pPr>
-            <a:r>
-              <a:rPr lang="ko-KR" altLang="en-US" sz="1600" dirty="0"/>
-              <a:t>첫 번째 </a:t>
-            </a:r>
-            <a:r>
-              <a:rPr lang="en-US" sz="1600" dirty="0"/>
-              <a:t>24bit :  4’b1100 + LOFF_STAT[4:0] + GPIO[1:0] + 13’b0 </a:t>
-            </a:r>
-            <a:r>
-              <a:rPr lang="en-US" altLang="ko-KR" sz="1600" dirty="0"/>
-              <a:t>(Status bits)</a:t>
-            </a:r>
-            <a:endParaRPr lang="en-US" sz="1600" dirty="0"/>
-          </a:p>
-          <a:p>
-            <a:pPr marL="0" indent="0">
-              <a:buNone/>
-            </a:pPr>
-            <a:r>
-              <a:rPr lang="en-US" altLang="ko-KR" sz="1600" dirty="0"/>
-              <a:t>(</a:t>
-            </a:r>
-            <a:r>
-              <a:rPr lang="en-US" sz="1600" dirty="0"/>
-              <a:t>LOFF_STAT[4:0] </a:t>
-            </a:r>
-            <a:r>
-              <a:rPr lang="en-US" altLang="ko-KR" sz="1600" dirty="0"/>
-              <a:t>= 5’b01000, </a:t>
-            </a:r>
-            <a:r>
-              <a:rPr lang="en-US" sz="1600" dirty="0"/>
-              <a:t>GPIO[1:0] = 2’b11)</a:t>
-            </a:r>
-          </a:p>
-          <a:p>
-            <a:pPr marL="0" indent="0">
-              <a:buNone/>
-            </a:pPr>
-            <a:r>
-              <a:rPr lang="ko-KR" altLang="en-US" sz="1600" dirty="0"/>
-              <a:t>두 번째 </a:t>
-            </a:r>
-            <a:r>
-              <a:rPr lang="en-US" altLang="ko-KR" sz="1600" dirty="0"/>
-              <a:t>24bit : CH1 </a:t>
-            </a:r>
-            <a:r>
-              <a:rPr lang="ko-KR" altLang="en-US" sz="1600" dirty="0"/>
-              <a:t>데이터 </a:t>
-            </a:r>
-            <a:endParaRPr lang="en-US" altLang="ko-KR" sz="1600" dirty="0"/>
-          </a:p>
-          <a:p>
-            <a:pPr marL="0" indent="0">
-              <a:buNone/>
-            </a:pPr>
-            <a:r>
-              <a:rPr lang="ko-KR" altLang="en-US" sz="1600" dirty="0"/>
-              <a:t>세 번째 </a:t>
-            </a:r>
-            <a:r>
-              <a:rPr lang="en-US" altLang="ko-KR" sz="1600" dirty="0"/>
-              <a:t>24bit : CH2 </a:t>
-            </a:r>
-            <a:r>
-              <a:rPr lang="ko-KR" altLang="en-US" sz="1600" dirty="0"/>
-              <a:t>데이터</a:t>
-            </a:r>
-            <a:endParaRPr lang="en-US" altLang="ko-KR" sz="1600" dirty="0"/>
-          </a:p>
-          <a:p>
-            <a:pPr marL="0" indent="0">
-              <a:buNone/>
-            </a:pPr>
-            <a:endParaRPr lang="en-US" altLang="ko-KR" sz="1600" dirty="0"/>
-          </a:p>
-          <a:p>
-            <a:pPr marL="0" indent="0">
-              <a:lnSpc>
-                <a:spcPct val="100000"/>
-              </a:lnSpc>
-              <a:buNone/>
-            </a:pPr>
-            <a:r>
-              <a:rPr lang="ko-KR" altLang="en-US" sz="1200" dirty="0"/>
-              <a:t>박사님께서 말씀하신 </a:t>
-            </a:r>
-            <a:r>
-              <a:rPr lang="en-US" altLang="ko-KR" sz="1200" dirty="0"/>
-              <a:t>0x66, 0xc0(Status bits) </a:t>
-            </a:r>
-            <a:r>
-              <a:rPr lang="ko-KR" altLang="en-US" sz="1200" dirty="0"/>
-              <a:t>는 초기 개발 시 </a:t>
-            </a:r>
-            <a:r>
-              <a:rPr lang="en-US" altLang="ko-KR" sz="1200" dirty="0"/>
-              <a:t> 72</a:t>
-            </a:r>
-            <a:r>
-              <a:rPr lang="ko-KR" altLang="en-US" sz="1200" dirty="0"/>
-              <a:t> </a:t>
-            </a:r>
-            <a:r>
-              <a:rPr lang="en-US" altLang="ko-KR" sz="1200" dirty="0"/>
-              <a:t>bits </a:t>
-            </a:r>
-            <a:r>
-              <a:rPr lang="ko-KR" altLang="en-US" sz="1200" dirty="0"/>
-              <a:t>전부 </a:t>
-            </a:r>
-            <a:r>
-              <a:rPr lang="en-US" altLang="ko-KR" sz="1200" dirty="0"/>
-              <a:t>PC</a:t>
-            </a:r>
-            <a:r>
-              <a:rPr lang="ko-KR" altLang="en-US" sz="1200" dirty="0"/>
-              <a:t>로 보냈을 때 나왔던 데이터 입니다</a:t>
-            </a:r>
-            <a:r>
-              <a:rPr lang="en-US" altLang="ko-KR" sz="1200" dirty="0"/>
-              <a:t>.</a:t>
-            </a:r>
-            <a:r>
-              <a:rPr lang="ko-KR" altLang="en-US" sz="1200" dirty="0"/>
-              <a:t> 현재는 수정을 하여 </a:t>
-            </a:r>
-            <a:r>
-              <a:rPr lang="en-US" altLang="ko-KR" sz="1200" dirty="0"/>
-              <a:t>{0x41, 0x00, CH2(3byte)}(5byte)</a:t>
-            </a:r>
-            <a:r>
-              <a:rPr lang="ko-KR" altLang="en-US" sz="1200" dirty="0" err="1"/>
-              <a:t>를</a:t>
-            </a:r>
-            <a:r>
-              <a:rPr lang="ko-KR" altLang="en-US" sz="1200" dirty="0"/>
-              <a:t> 보냅니다</a:t>
-            </a:r>
-            <a:r>
-              <a:rPr lang="en-US" altLang="ko-KR" sz="1200" dirty="0"/>
-              <a:t> (</a:t>
-            </a:r>
-            <a:r>
-              <a:rPr lang="ko-KR" altLang="en-US" sz="1200" dirty="0"/>
-              <a:t>현재 </a:t>
-            </a:r>
-            <a:r>
-              <a:rPr lang="en-US" altLang="ko-KR" sz="1200" dirty="0"/>
-              <a:t>2</a:t>
-            </a:r>
-            <a:r>
-              <a:rPr lang="ko-KR" altLang="en-US" sz="1200" dirty="0"/>
-              <a:t>번째 </a:t>
-            </a:r>
-            <a:r>
-              <a:rPr lang="en-US" altLang="ko-KR" sz="1200" dirty="0"/>
-              <a:t>byte</a:t>
-            </a:r>
-            <a:r>
-              <a:rPr lang="ko-KR" altLang="en-US" sz="1200" dirty="0"/>
-              <a:t> </a:t>
-            </a:r>
-            <a:r>
-              <a:rPr lang="en-US" altLang="ko-KR" sz="1200" dirty="0"/>
-              <a:t>0x00 </a:t>
-            </a:r>
-            <a:r>
-              <a:rPr lang="ko-KR" altLang="en-US" sz="1200" dirty="0"/>
-              <a:t>은 사용하지 않는 값입니다</a:t>
-            </a:r>
-            <a:r>
-              <a:rPr lang="en-US" altLang="ko-KR" sz="1200"/>
-              <a:t>.).</a:t>
-            </a:r>
-            <a:r>
-              <a:rPr lang="ko-KR" altLang="en-US" sz="1200" dirty="0"/>
-              <a:t> 초기에 개발을 하였을 때 </a:t>
-            </a:r>
-            <a:r>
-              <a:rPr lang="en-US" altLang="ko-KR" sz="1200" dirty="0"/>
-              <a:t>CH1 </a:t>
-            </a:r>
-            <a:r>
-              <a:rPr lang="ko-KR" altLang="en-US" sz="1200" dirty="0"/>
-              <a:t>과 </a:t>
-            </a:r>
-            <a:r>
-              <a:rPr lang="en-US" altLang="ko-KR" sz="1200" dirty="0"/>
-              <a:t>CH2 </a:t>
-            </a:r>
-            <a:r>
-              <a:rPr lang="ko-KR" altLang="en-US" sz="1200" dirty="0"/>
-              <a:t>데이터를 모두 </a:t>
-            </a:r>
-            <a:r>
-              <a:rPr lang="en-US" altLang="ko-KR" sz="1200" dirty="0"/>
-              <a:t>QT </a:t>
-            </a:r>
-            <a:r>
-              <a:rPr lang="ko-KR" altLang="en-US" sz="1200" dirty="0"/>
-              <a:t>그래프 상에 표시했지만 데이터 시트를 분석 해본 결과 </a:t>
-            </a:r>
-            <a:r>
-              <a:rPr lang="en-US" altLang="ko-KR" sz="1200" dirty="0"/>
-              <a:t>4</a:t>
-            </a:r>
-            <a:r>
-              <a:rPr lang="ko-KR" altLang="en-US" sz="1200" dirty="0"/>
-              <a:t>개의 </a:t>
-            </a:r>
-            <a:r>
-              <a:rPr lang="en-US" altLang="ko-KR" sz="1200" dirty="0"/>
-              <a:t>ECG</a:t>
-            </a:r>
-            <a:r>
-              <a:rPr lang="ko-KR" altLang="en-US" sz="1200" dirty="0"/>
-              <a:t>가 </a:t>
-            </a:r>
-            <a:r>
-              <a:rPr lang="en-US" altLang="ko-KR" sz="1200" dirty="0"/>
-              <a:t>LEFT Arm, Right Arm, Left Leg, Right Leg(Ground) </a:t>
-            </a:r>
-            <a:r>
-              <a:rPr lang="ko-KR" altLang="en-US" sz="1200" dirty="0"/>
-              <a:t>로 측정한다는 것을 알았습니다</a:t>
-            </a:r>
-            <a:r>
-              <a:rPr lang="en-US" altLang="ko-KR" sz="1200" dirty="0"/>
-              <a:t>.</a:t>
-            </a:r>
-            <a:r>
-              <a:rPr lang="ko-KR" altLang="en-US" sz="1200" dirty="0"/>
-              <a:t>  따라서 </a:t>
-            </a:r>
-            <a:r>
-              <a:rPr lang="en-US" altLang="ko-KR" sz="1200" dirty="0"/>
-              <a:t>CH1SET(0x04) </a:t>
-            </a:r>
-            <a:r>
-              <a:rPr lang="ko-KR" altLang="en-US" sz="1200" dirty="0"/>
-              <a:t>세팅</a:t>
-            </a:r>
-            <a:r>
-              <a:rPr lang="en-US" altLang="ko-KR" sz="1200" dirty="0"/>
-              <a:t> </a:t>
-            </a:r>
-            <a:r>
-              <a:rPr lang="ko-KR" altLang="en-US" sz="1200" dirty="0"/>
-              <a:t>값을 설정하여 </a:t>
-            </a:r>
-            <a:r>
-              <a:rPr lang="en-US" altLang="ko-KR" sz="1200" dirty="0"/>
-              <a:t>CH1 </a:t>
-            </a:r>
-            <a:r>
-              <a:rPr lang="ko-KR" altLang="en-US" sz="1200" dirty="0"/>
-              <a:t>을 </a:t>
-            </a:r>
-            <a:r>
-              <a:rPr lang="en-US" altLang="ko-KR" sz="1200" dirty="0"/>
-              <a:t>Disable </a:t>
-            </a:r>
-            <a:r>
-              <a:rPr lang="ko-KR" altLang="en-US" sz="1200" dirty="0"/>
-              <a:t>시켰고 </a:t>
-            </a:r>
-            <a:r>
-              <a:rPr lang="en-US" altLang="ko-KR" sz="1200" dirty="0"/>
-              <a:t>CH2 </a:t>
-            </a:r>
-            <a:r>
-              <a:rPr lang="ko-KR" altLang="en-US" sz="1200" dirty="0"/>
-              <a:t>의 데이터 만 </a:t>
-            </a:r>
-            <a:r>
-              <a:rPr lang="en-US" altLang="ko-KR" sz="1200" dirty="0"/>
-              <a:t>PC</a:t>
-            </a:r>
-            <a:r>
-              <a:rPr lang="ko-KR" altLang="en-US" sz="1200" dirty="0"/>
-              <a:t>로 보내도록 하였습니다</a:t>
-            </a:r>
-            <a:r>
-              <a:rPr lang="en-US" altLang="ko-KR" sz="1200" dirty="0"/>
-              <a:t>.</a:t>
-            </a:r>
-            <a:r>
-              <a:rPr lang="ko-KR" altLang="en-US" sz="1200" dirty="0"/>
-              <a:t> </a:t>
-            </a:r>
-            <a:endParaRPr lang="en-US" altLang="ko-KR" sz="1200" dirty="0"/>
-          </a:p>
-          <a:p>
-            <a:pPr marL="0" indent="0">
-              <a:lnSpc>
-                <a:spcPct val="100000"/>
-              </a:lnSpc>
-              <a:buNone/>
-            </a:pPr>
-            <a:r>
-              <a:rPr lang="ko-KR" altLang="en-US" sz="1200" dirty="0"/>
-              <a:t>결과적으로 박사님께서 말씀하신 마지막 </a:t>
-            </a:r>
-            <a:r>
-              <a:rPr lang="en-US" altLang="ko-KR" sz="1200" dirty="0"/>
-              <a:t>3byte</a:t>
-            </a:r>
-            <a:r>
-              <a:rPr lang="ko-KR" altLang="en-US" sz="1200" dirty="0"/>
-              <a:t>가 심전도 데이터가 맞습니다</a:t>
-            </a:r>
-            <a:r>
-              <a:rPr lang="en-US" altLang="ko-KR" sz="1200" dirty="0"/>
-              <a:t>.</a:t>
-            </a:r>
-            <a:r>
-              <a:rPr lang="ko-KR" altLang="en-US" sz="1200" dirty="0"/>
-              <a:t> </a:t>
-            </a:r>
-            <a:endParaRPr lang="en-US" altLang="ko-KR" sz="1200" dirty="0"/>
-          </a:p>
-          <a:p>
-            <a:pPr marL="0" indent="0">
-              <a:lnSpc>
-                <a:spcPct val="100000"/>
-              </a:lnSpc>
-              <a:buNone/>
-            </a:pPr>
-            <a:endParaRPr lang="en-US" sz="1200" dirty="0"/>
-          </a:p>
-          <a:p>
-            <a:pPr marL="0" indent="0">
-              <a:lnSpc>
-                <a:spcPct val="100000"/>
-              </a:lnSpc>
-              <a:buNone/>
-            </a:pPr>
-            <a:r>
-              <a:rPr lang="en-US" altLang="ko-KR" sz="1600" dirty="0"/>
-              <a:t>3.</a:t>
-            </a:r>
-            <a:r>
-              <a:rPr lang="ko-KR" altLang="en-US" sz="1600" dirty="0"/>
-              <a:t> </a:t>
-            </a:r>
-            <a:r>
-              <a:rPr lang="en-US" altLang="ko-KR" sz="1600" dirty="0"/>
-              <a:t>PPT 2</a:t>
-            </a:r>
-            <a:r>
-              <a:rPr lang="ko-KR" altLang="en-US" sz="1600" dirty="0"/>
-              <a:t>번 째 페이지의 </a:t>
-            </a:r>
-            <a:r>
-              <a:rPr lang="en-US" altLang="ko-KR" sz="1600" dirty="0"/>
-              <a:t>ADS</a:t>
-            </a:r>
-            <a:r>
-              <a:rPr lang="ko-KR" altLang="en-US" sz="1600" dirty="0"/>
-              <a:t>에 조건 완료라는 의미는 </a:t>
-            </a:r>
-            <a:r>
-              <a:rPr lang="en-US" altLang="ko-KR" sz="1600" dirty="0"/>
-              <a:t>ADS</a:t>
-            </a:r>
-            <a:r>
-              <a:rPr lang="ko-KR" altLang="en-US" sz="1600" dirty="0"/>
-              <a:t>가 일정 주기로 데이터를 내보내는데 그 조건을 만족 했을 때만 </a:t>
-            </a:r>
-            <a:r>
-              <a:rPr lang="en-US" altLang="ko-KR" sz="1600" dirty="0"/>
-              <a:t>ADS</a:t>
-            </a:r>
-            <a:r>
-              <a:rPr lang="ko-KR" altLang="en-US" sz="1600" dirty="0"/>
-              <a:t>의 데이터 </a:t>
-            </a:r>
-            <a:r>
-              <a:rPr lang="en-US" altLang="ko-KR" sz="1600" dirty="0"/>
-              <a:t>72bits </a:t>
-            </a:r>
-            <a:r>
-              <a:rPr lang="ko-KR" altLang="en-US" sz="1600" dirty="0" err="1"/>
-              <a:t>를</a:t>
-            </a:r>
-            <a:r>
-              <a:rPr lang="ko-KR" altLang="en-US" sz="1600" dirty="0"/>
-              <a:t> 내보낸다는 의미입니다</a:t>
-            </a:r>
-            <a:r>
-              <a:rPr lang="en-US" altLang="ko-KR" sz="1600" dirty="0"/>
-              <a:t>.</a:t>
-            </a:r>
-            <a:r>
-              <a:rPr lang="ko-KR" altLang="en-US" sz="1600" dirty="0"/>
-              <a:t> </a:t>
-            </a:r>
-            <a:endParaRPr lang="en-US" altLang="ko-KR" sz="1600" dirty="0"/>
-          </a:p>
-          <a:p>
-            <a:pPr marL="0" indent="0">
-              <a:lnSpc>
-                <a:spcPct val="100000"/>
-              </a:lnSpc>
-              <a:buNone/>
-            </a:pPr>
-            <a:endParaRPr lang="en-US" sz="1600" dirty="0"/>
-          </a:p>
-          <a:p>
-            <a:pPr marL="0" indent="0">
-              <a:lnSpc>
-                <a:spcPct val="100000"/>
-              </a:lnSpc>
-              <a:buNone/>
-            </a:pPr>
-            <a:r>
-              <a:rPr lang="en-US" altLang="ko-KR" sz="1600" dirty="0"/>
-              <a:t>4.</a:t>
-            </a:r>
-            <a:r>
-              <a:rPr lang="ko-KR" altLang="en-US" sz="1600" dirty="0"/>
-              <a:t>  현재 </a:t>
-            </a:r>
-            <a:r>
-              <a:rPr lang="en-US" altLang="ko-KR" sz="1600" dirty="0"/>
-              <a:t>QT</a:t>
-            </a:r>
-            <a:r>
-              <a:rPr lang="ko-KR" altLang="en-US" sz="1600" dirty="0"/>
-              <a:t> 상의 </a:t>
-            </a:r>
-            <a:r>
-              <a:rPr lang="en-US" altLang="ko-KR" sz="1600" dirty="0"/>
-              <a:t>Tab </a:t>
-            </a:r>
-            <a:r>
-              <a:rPr lang="ko-KR" altLang="en-US" sz="1600" dirty="0"/>
-              <a:t>에 있는 </a:t>
-            </a:r>
-            <a:r>
-              <a:rPr lang="en-US" altLang="ko-KR" sz="1600" dirty="0"/>
-              <a:t>Sync </a:t>
-            </a:r>
-            <a:r>
-              <a:rPr lang="ko-KR" altLang="en-US" sz="1600" dirty="0"/>
-              <a:t>버튼의 동작은 완벽하지 않습니다</a:t>
-            </a:r>
-            <a:r>
-              <a:rPr lang="en-US" altLang="ko-KR" sz="1600" dirty="0"/>
-              <a:t>.</a:t>
-            </a:r>
-            <a:r>
-              <a:rPr lang="ko-KR" altLang="en-US" sz="1600" dirty="0"/>
-              <a:t> 사용을 안하시는 것이 좋을 것 같습니다</a:t>
-            </a:r>
-            <a:r>
-              <a:rPr lang="en-US" altLang="ko-KR" sz="1600" dirty="0"/>
-              <a:t>.</a:t>
-            </a:r>
-            <a:r>
-              <a:rPr lang="ko-KR" altLang="en-US" sz="1600" dirty="0"/>
-              <a:t> </a:t>
-            </a:r>
-            <a:endParaRPr lang="en-US" sz="1600" dirty="0"/>
-          </a:p>
-        </p:txBody>
-      </p:sp>
-    </p:spTree>
-    <p:extLst>
-      <p:ext uri="{BB962C8B-B14F-4D97-AF65-F5344CB8AC3E}">
-        <p14:creationId xmlns:p14="http://schemas.microsoft.com/office/powerpoint/2010/main" val="3419505496"/>
       </p:ext>
     </p:extLst>
   </p:cSld>

</xml_diff>